<commit_message>
saved as PDF + added cute icons on last page of user-manual
</commit_message>
<xml_diff>
--- a/do not ZIP for moodle/system_docs.pptx
+++ b/do not ZIP for moodle/system_docs.pptx
@@ -190,7 +190,7 @@
             </a:lvl1pPr>
           </a:lstStyle>
           <a:p>
-            <a:endParaRPr lang="he-IL"/>
+            <a:endParaRPr lang="he-IL" dirty="0"/>
           </a:p>
         </p:txBody>
       </p:sp>
@@ -223,9 +223,9 @@
           <a:p>
             <a:fld id="{BBC68DE7-BDF4-4968-884A-7F1AE552AC52}" type="datetimeFigureOut">
               <a:rPr lang="he-IL" smtClean="0"/>
-              <a:t>א'/שבט/תשפ"ה</a:t>
+              <a:t>ב'/שבט/תשפ"ה</a:t>
             </a:fld>
-            <a:endParaRPr lang="he-IL"/>
+            <a:endParaRPr lang="he-IL" dirty="0"/>
           </a:p>
         </p:txBody>
       </p:sp>
@@ -258,7 +258,7 @@
           <a:bodyPr vert="horz" lIns="91440" tIns="45720" rIns="91440" bIns="45720" rtlCol="1" anchor="ctr"/>
           <a:lstStyle/>
           <a:p>
-            <a:endParaRPr lang="he-IL"/>
+            <a:endParaRPr lang="he-IL" dirty="0"/>
           </a:p>
         </p:txBody>
       </p:sp>
@@ -348,7 +348,7 @@
             </a:lvl1pPr>
           </a:lstStyle>
           <a:p>
-            <a:endParaRPr lang="he-IL"/>
+            <a:endParaRPr lang="he-IL" dirty="0"/>
           </a:p>
         </p:txBody>
       </p:sp>
@@ -383,7 +383,7 @@
               <a:rPr lang="he-IL" smtClean="0"/>
               <a:t>‹#›</a:t>
             </a:fld>
-            <a:endParaRPr lang="he-IL"/>
+            <a:endParaRPr lang="he-IL" dirty="0"/>
           </a:p>
         </p:txBody>
       </p:sp>
@@ -534,7 +534,7 @@
           <a:bodyPr/>
           <a:lstStyle/>
           <a:p>
-            <a:endParaRPr lang="he-IL"/>
+            <a:endParaRPr lang="he-IL" dirty="0"/>
           </a:p>
         </p:txBody>
       </p:sp>
@@ -557,7 +557,7 @@
               <a:rPr lang="he-IL" smtClean="0"/>
               <a:t>1</a:t>
             </a:fld>
-            <a:endParaRPr lang="he-IL"/>
+            <a:endParaRPr lang="he-IL" dirty="0"/>
           </a:p>
         </p:txBody>
       </p:sp>
@@ -665,7 +665,7 @@
               <a:rPr lang="he-IL" smtClean="0"/>
               <a:t>10</a:t>
             </a:fld>
-            <a:endParaRPr lang="he-IL"/>
+            <a:endParaRPr lang="he-IL" dirty="0"/>
           </a:p>
         </p:txBody>
       </p:sp>
@@ -773,7 +773,7 @@
               <a:rPr lang="he-IL" smtClean="0"/>
               <a:t>11</a:t>
             </a:fld>
-            <a:endParaRPr lang="he-IL"/>
+            <a:endParaRPr lang="he-IL" dirty="0"/>
           </a:p>
         </p:txBody>
       </p:sp>
@@ -881,7 +881,7 @@
               <a:rPr lang="he-IL" smtClean="0"/>
               <a:t>12</a:t>
             </a:fld>
-            <a:endParaRPr lang="he-IL"/>
+            <a:endParaRPr lang="he-IL" dirty="0"/>
           </a:p>
         </p:txBody>
       </p:sp>
@@ -989,7 +989,7 @@
               <a:rPr lang="he-IL" smtClean="0"/>
               <a:t>13</a:t>
             </a:fld>
-            <a:endParaRPr lang="he-IL"/>
+            <a:endParaRPr lang="he-IL" dirty="0"/>
           </a:p>
         </p:txBody>
       </p:sp>
@@ -1097,7 +1097,7 @@
               <a:rPr lang="he-IL" smtClean="0"/>
               <a:t>14</a:t>
             </a:fld>
-            <a:endParaRPr lang="he-IL"/>
+            <a:endParaRPr lang="he-IL" dirty="0"/>
           </a:p>
         </p:txBody>
       </p:sp>
@@ -1205,7 +1205,7 @@
               <a:rPr lang="he-IL" smtClean="0"/>
               <a:t>15</a:t>
             </a:fld>
-            <a:endParaRPr lang="he-IL"/>
+            <a:endParaRPr lang="he-IL" dirty="0"/>
           </a:p>
         </p:txBody>
       </p:sp>
@@ -1313,7 +1313,7 @@
               <a:rPr lang="he-IL" smtClean="0"/>
               <a:t>2</a:t>
             </a:fld>
-            <a:endParaRPr lang="he-IL"/>
+            <a:endParaRPr lang="he-IL" dirty="0"/>
           </a:p>
         </p:txBody>
       </p:sp>
@@ -1421,7 +1421,7 @@
               <a:rPr lang="he-IL" smtClean="0"/>
               <a:t>3</a:t>
             </a:fld>
-            <a:endParaRPr lang="he-IL"/>
+            <a:endParaRPr lang="he-IL" dirty="0"/>
           </a:p>
         </p:txBody>
       </p:sp>
@@ -1529,7 +1529,7 @@
               <a:rPr lang="he-IL" smtClean="0"/>
               <a:t>4</a:t>
             </a:fld>
-            <a:endParaRPr lang="he-IL"/>
+            <a:endParaRPr lang="he-IL" dirty="0"/>
           </a:p>
         </p:txBody>
       </p:sp>
@@ -1637,7 +1637,7 @@
               <a:rPr lang="he-IL" smtClean="0"/>
               <a:t>5</a:t>
             </a:fld>
-            <a:endParaRPr lang="he-IL"/>
+            <a:endParaRPr lang="he-IL" dirty="0"/>
           </a:p>
         </p:txBody>
       </p:sp>
@@ -1745,7 +1745,7 @@
               <a:rPr lang="he-IL" smtClean="0"/>
               <a:t>6</a:t>
             </a:fld>
-            <a:endParaRPr lang="he-IL"/>
+            <a:endParaRPr lang="he-IL" dirty="0"/>
           </a:p>
         </p:txBody>
       </p:sp>
@@ -1853,7 +1853,7 @@
               <a:rPr lang="he-IL" smtClean="0"/>
               <a:t>7</a:t>
             </a:fld>
-            <a:endParaRPr lang="he-IL"/>
+            <a:endParaRPr lang="he-IL" dirty="0"/>
           </a:p>
         </p:txBody>
       </p:sp>
@@ -1961,7 +1961,7 @@
               <a:rPr lang="he-IL" smtClean="0"/>
               <a:t>8</a:t>
             </a:fld>
-            <a:endParaRPr lang="he-IL"/>
+            <a:endParaRPr lang="he-IL" dirty="0"/>
           </a:p>
         </p:txBody>
       </p:sp>
@@ -2069,7 +2069,7 @@
               <a:rPr lang="he-IL" smtClean="0"/>
               <a:t>9</a:t>
             </a:fld>
-            <a:endParaRPr lang="he-IL"/>
+            <a:endParaRPr lang="he-IL" dirty="0"/>
           </a:p>
         </p:txBody>
       </p:sp>
@@ -2217,9 +2217,9 @@
           <a:p>
             <a:fld id="{A05FCE8D-BEC0-4FB0-B4E4-C13D2CD9A77F}" type="datetimeFigureOut">
               <a:rPr lang="he-IL" smtClean="0"/>
-              <a:t>א'/שבט/תשפ"ה</a:t>
+              <a:t>ב'/שבט/תשפ"ה</a:t>
             </a:fld>
-            <a:endParaRPr lang="he-IL"/>
+            <a:endParaRPr lang="he-IL" dirty="0"/>
           </a:p>
         </p:txBody>
       </p:sp>
@@ -2238,7 +2238,7 @@
           <a:bodyPr/>
           <a:lstStyle/>
           <a:p>
-            <a:endParaRPr lang="he-IL"/>
+            <a:endParaRPr lang="he-IL" dirty="0"/>
           </a:p>
         </p:txBody>
       </p:sp>
@@ -2261,7 +2261,7 @@
               <a:rPr lang="he-IL" smtClean="0"/>
               <a:t>‹#›</a:t>
             </a:fld>
-            <a:endParaRPr lang="he-IL"/>
+            <a:endParaRPr lang="he-IL" dirty="0"/>
           </a:p>
         </p:txBody>
       </p:sp>
@@ -2387,9 +2387,9 @@
           <a:p>
             <a:fld id="{A05FCE8D-BEC0-4FB0-B4E4-C13D2CD9A77F}" type="datetimeFigureOut">
               <a:rPr lang="he-IL" smtClean="0"/>
-              <a:t>א'/שבט/תשפ"ה</a:t>
+              <a:t>ב'/שבט/תשפ"ה</a:t>
             </a:fld>
-            <a:endParaRPr lang="he-IL"/>
+            <a:endParaRPr lang="he-IL" dirty="0"/>
           </a:p>
         </p:txBody>
       </p:sp>
@@ -2408,7 +2408,7 @@
           <a:bodyPr/>
           <a:lstStyle/>
           <a:p>
-            <a:endParaRPr lang="he-IL"/>
+            <a:endParaRPr lang="he-IL" dirty="0"/>
           </a:p>
         </p:txBody>
       </p:sp>
@@ -2431,7 +2431,7 @@
               <a:rPr lang="he-IL" smtClean="0"/>
               <a:t>‹#›</a:t>
             </a:fld>
-            <a:endParaRPr lang="he-IL"/>
+            <a:endParaRPr lang="he-IL" dirty="0"/>
           </a:p>
         </p:txBody>
       </p:sp>
@@ -2567,9 +2567,9 @@
           <a:p>
             <a:fld id="{A05FCE8D-BEC0-4FB0-B4E4-C13D2CD9A77F}" type="datetimeFigureOut">
               <a:rPr lang="he-IL" smtClean="0"/>
-              <a:t>א'/שבט/תשפ"ה</a:t>
+              <a:t>ב'/שבט/תשפ"ה</a:t>
             </a:fld>
-            <a:endParaRPr lang="he-IL"/>
+            <a:endParaRPr lang="he-IL" dirty="0"/>
           </a:p>
         </p:txBody>
       </p:sp>
@@ -2588,7 +2588,7 @@
           <a:bodyPr/>
           <a:lstStyle/>
           <a:p>
-            <a:endParaRPr lang="he-IL"/>
+            <a:endParaRPr lang="he-IL" dirty="0"/>
           </a:p>
         </p:txBody>
       </p:sp>
@@ -2611,7 +2611,7 @@
               <a:rPr lang="he-IL" smtClean="0"/>
               <a:t>‹#›</a:t>
             </a:fld>
-            <a:endParaRPr lang="he-IL"/>
+            <a:endParaRPr lang="he-IL" dirty="0"/>
           </a:p>
         </p:txBody>
       </p:sp>
@@ -2737,9 +2737,9 @@
           <a:p>
             <a:fld id="{A05FCE8D-BEC0-4FB0-B4E4-C13D2CD9A77F}" type="datetimeFigureOut">
               <a:rPr lang="he-IL" smtClean="0"/>
-              <a:t>א'/שבט/תשפ"ה</a:t>
+              <a:t>ב'/שבט/תשפ"ה</a:t>
             </a:fld>
-            <a:endParaRPr lang="he-IL"/>
+            <a:endParaRPr lang="he-IL" dirty="0"/>
           </a:p>
         </p:txBody>
       </p:sp>
@@ -2758,7 +2758,7 @@
           <a:bodyPr/>
           <a:lstStyle/>
           <a:p>
-            <a:endParaRPr lang="he-IL"/>
+            <a:endParaRPr lang="he-IL" dirty="0"/>
           </a:p>
         </p:txBody>
       </p:sp>
@@ -2781,7 +2781,7 @@
               <a:rPr lang="he-IL" smtClean="0"/>
               <a:t>‹#›</a:t>
             </a:fld>
-            <a:endParaRPr lang="he-IL"/>
+            <a:endParaRPr lang="he-IL" dirty="0"/>
           </a:p>
         </p:txBody>
       </p:sp>
@@ -2983,9 +2983,9 @@
           <a:p>
             <a:fld id="{A05FCE8D-BEC0-4FB0-B4E4-C13D2CD9A77F}" type="datetimeFigureOut">
               <a:rPr lang="he-IL" smtClean="0"/>
-              <a:t>א'/שבט/תשפ"ה</a:t>
+              <a:t>ב'/שבט/תשפ"ה</a:t>
             </a:fld>
-            <a:endParaRPr lang="he-IL"/>
+            <a:endParaRPr lang="he-IL" dirty="0"/>
           </a:p>
         </p:txBody>
       </p:sp>
@@ -3004,7 +3004,7 @@
           <a:bodyPr/>
           <a:lstStyle/>
           <a:p>
-            <a:endParaRPr lang="he-IL"/>
+            <a:endParaRPr lang="he-IL" dirty="0"/>
           </a:p>
         </p:txBody>
       </p:sp>
@@ -3027,7 +3027,7 @@
               <a:rPr lang="he-IL" smtClean="0"/>
               <a:t>‹#›</a:t>
             </a:fld>
-            <a:endParaRPr lang="he-IL"/>
+            <a:endParaRPr lang="he-IL" dirty="0"/>
           </a:p>
         </p:txBody>
       </p:sp>
@@ -3215,9 +3215,9 @@
           <a:p>
             <a:fld id="{A05FCE8D-BEC0-4FB0-B4E4-C13D2CD9A77F}" type="datetimeFigureOut">
               <a:rPr lang="he-IL" smtClean="0"/>
-              <a:t>א'/שבט/תשפ"ה</a:t>
+              <a:t>ב'/שבט/תשפ"ה</a:t>
             </a:fld>
-            <a:endParaRPr lang="he-IL"/>
+            <a:endParaRPr lang="he-IL" dirty="0"/>
           </a:p>
         </p:txBody>
       </p:sp>
@@ -3236,7 +3236,7 @@
           <a:bodyPr/>
           <a:lstStyle/>
           <a:p>
-            <a:endParaRPr lang="he-IL"/>
+            <a:endParaRPr lang="he-IL" dirty="0"/>
           </a:p>
         </p:txBody>
       </p:sp>
@@ -3259,7 +3259,7 @@
               <a:rPr lang="he-IL" smtClean="0"/>
               <a:t>‹#›</a:t>
             </a:fld>
-            <a:endParaRPr lang="he-IL"/>
+            <a:endParaRPr lang="he-IL" dirty="0"/>
           </a:p>
         </p:txBody>
       </p:sp>
@@ -3582,9 +3582,9 @@
           <a:p>
             <a:fld id="{A05FCE8D-BEC0-4FB0-B4E4-C13D2CD9A77F}" type="datetimeFigureOut">
               <a:rPr lang="he-IL" smtClean="0"/>
-              <a:t>א'/שבט/תשפ"ה</a:t>
+              <a:t>ב'/שבט/תשפ"ה</a:t>
             </a:fld>
-            <a:endParaRPr lang="he-IL"/>
+            <a:endParaRPr lang="he-IL" dirty="0"/>
           </a:p>
         </p:txBody>
       </p:sp>
@@ -3603,7 +3603,7 @@
           <a:bodyPr/>
           <a:lstStyle/>
           <a:p>
-            <a:endParaRPr lang="he-IL"/>
+            <a:endParaRPr lang="he-IL" dirty="0"/>
           </a:p>
         </p:txBody>
       </p:sp>
@@ -3626,7 +3626,7 @@
               <a:rPr lang="he-IL" smtClean="0"/>
               <a:t>‹#›</a:t>
             </a:fld>
-            <a:endParaRPr lang="he-IL"/>
+            <a:endParaRPr lang="he-IL" dirty="0"/>
           </a:p>
         </p:txBody>
       </p:sp>
@@ -3700,9 +3700,9 @@
           <a:p>
             <a:fld id="{A05FCE8D-BEC0-4FB0-B4E4-C13D2CD9A77F}" type="datetimeFigureOut">
               <a:rPr lang="he-IL" smtClean="0"/>
-              <a:t>א'/שבט/תשפ"ה</a:t>
+              <a:t>ב'/שבט/תשפ"ה</a:t>
             </a:fld>
-            <a:endParaRPr lang="he-IL"/>
+            <a:endParaRPr lang="he-IL" dirty="0"/>
           </a:p>
         </p:txBody>
       </p:sp>
@@ -3721,7 +3721,7 @@
           <a:bodyPr/>
           <a:lstStyle/>
           <a:p>
-            <a:endParaRPr lang="he-IL"/>
+            <a:endParaRPr lang="he-IL" dirty="0"/>
           </a:p>
         </p:txBody>
       </p:sp>
@@ -3744,7 +3744,7 @@
               <a:rPr lang="he-IL" smtClean="0"/>
               <a:t>‹#›</a:t>
             </a:fld>
-            <a:endParaRPr lang="he-IL"/>
+            <a:endParaRPr lang="he-IL" dirty="0"/>
           </a:p>
         </p:txBody>
       </p:sp>
@@ -3795,9 +3795,9 @@
           <a:p>
             <a:fld id="{A05FCE8D-BEC0-4FB0-B4E4-C13D2CD9A77F}" type="datetimeFigureOut">
               <a:rPr lang="he-IL" smtClean="0"/>
-              <a:t>א'/שבט/תשפ"ה</a:t>
+              <a:t>ב'/שבט/תשפ"ה</a:t>
             </a:fld>
-            <a:endParaRPr lang="he-IL"/>
+            <a:endParaRPr lang="he-IL" dirty="0"/>
           </a:p>
         </p:txBody>
       </p:sp>
@@ -3816,7 +3816,7 @@
           <a:bodyPr/>
           <a:lstStyle/>
           <a:p>
-            <a:endParaRPr lang="he-IL"/>
+            <a:endParaRPr lang="he-IL" dirty="0"/>
           </a:p>
         </p:txBody>
       </p:sp>
@@ -3839,7 +3839,7 @@
               <a:rPr lang="he-IL" smtClean="0"/>
               <a:t>‹#›</a:t>
             </a:fld>
-            <a:endParaRPr lang="he-IL"/>
+            <a:endParaRPr lang="he-IL" dirty="0"/>
           </a:p>
         </p:txBody>
       </p:sp>
@@ -4072,9 +4072,9 @@
           <a:p>
             <a:fld id="{A05FCE8D-BEC0-4FB0-B4E4-C13D2CD9A77F}" type="datetimeFigureOut">
               <a:rPr lang="he-IL" smtClean="0"/>
-              <a:t>א'/שבט/תשפ"ה</a:t>
+              <a:t>ב'/שבט/תשפ"ה</a:t>
             </a:fld>
-            <a:endParaRPr lang="he-IL"/>
+            <a:endParaRPr lang="he-IL" dirty="0"/>
           </a:p>
         </p:txBody>
       </p:sp>
@@ -4093,7 +4093,7 @@
           <a:bodyPr/>
           <a:lstStyle/>
           <a:p>
-            <a:endParaRPr lang="he-IL"/>
+            <a:endParaRPr lang="he-IL" dirty="0"/>
           </a:p>
         </p:txBody>
       </p:sp>
@@ -4116,7 +4116,7 @@
               <a:rPr lang="he-IL" smtClean="0"/>
               <a:t>‹#›</a:t>
             </a:fld>
-            <a:endParaRPr lang="he-IL"/>
+            <a:endParaRPr lang="he-IL" dirty="0"/>
           </a:p>
         </p:txBody>
       </p:sp>
@@ -4240,7 +4240,7 @@
           </a:lstStyle>
           <a:p>
             <a:r>
-              <a:rPr lang="he-IL"/>
+              <a:rPr lang="he-IL" dirty="0"/>
               <a:t>לחץ על הסמל כדי להוסיף תמונה</a:t>
             </a:r>
             <a:endParaRPr lang="en-US" dirty="0"/>
@@ -4329,9 +4329,9 @@
           <a:p>
             <a:fld id="{A05FCE8D-BEC0-4FB0-B4E4-C13D2CD9A77F}" type="datetimeFigureOut">
               <a:rPr lang="he-IL" smtClean="0"/>
-              <a:t>א'/שבט/תשפ"ה</a:t>
+              <a:t>ב'/שבט/תשפ"ה</a:t>
             </a:fld>
-            <a:endParaRPr lang="he-IL"/>
+            <a:endParaRPr lang="he-IL" dirty="0"/>
           </a:p>
         </p:txBody>
       </p:sp>
@@ -4350,7 +4350,7 @@
           <a:bodyPr/>
           <a:lstStyle/>
           <a:p>
-            <a:endParaRPr lang="he-IL"/>
+            <a:endParaRPr lang="he-IL" dirty="0"/>
           </a:p>
         </p:txBody>
       </p:sp>
@@ -4373,7 +4373,7 @@
               <a:rPr lang="he-IL" smtClean="0"/>
               <a:t>‹#›</a:t>
             </a:fld>
-            <a:endParaRPr lang="he-IL"/>
+            <a:endParaRPr lang="he-IL" dirty="0"/>
           </a:p>
         </p:txBody>
       </p:sp>
@@ -4542,9 +4542,9 @@
           <a:p>
             <a:fld id="{A05FCE8D-BEC0-4FB0-B4E4-C13D2CD9A77F}" type="datetimeFigureOut">
               <a:rPr lang="he-IL" smtClean="0"/>
-              <a:t>א'/שבט/תשפ"ה</a:t>
+              <a:t>ב'/שבט/תשפ"ה</a:t>
             </a:fld>
-            <a:endParaRPr lang="he-IL"/>
+            <a:endParaRPr lang="he-IL" dirty="0"/>
           </a:p>
         </p:txBody>
       </p:sp>
@@ -4581,7 +4581,7 @@
             </a:lvl1pPr>
           </a:lstStyle>
           <a:p>
-            <a:endParaRPr lang="he-IL"/>
+            <a:endParaRPr lang="he-IL" dirty="0"/>
           </a:p>
         </p:txBody>
       </p:sp>
@@ -4622,7 +4622,7 @@
               <a:rPr lang="he-IL" smtClean="0"/>
               <a:t>‹#›</a:t>
             </a:fld>
-            <a:endParaRPr lang="he-IL"/>
+            <a:endParaRPr lang="he-IL" dirty="0"/>
           </a:p>
         </p:txBody>
       </p:sp>
@@ -5016,25 +5016,7 @@
                 </a:solidFill>
                 <a:latin typeface="Bahnschrift Light SemiCondensed" panose="020B0502040204020203" pitchFamily="34" charset="0"/>
               </a:rPr>
-              <a:t>DBMS Final Assignment		 | 		Michal Berkheim, Michal Lahav, </a:t>
-            </a:r>
-            <a:r>
-              <a:rPr lang="en-US" sz="1400" dirty="0" err="1">
-                <a:solidFill>
-                  <a:srgbClr val="FDCB95"/>
-                </a:solidFill>
-                <a:latin typeface="Bahnschrift Light SemiCondensed" panose="020B0502040204020203" pitchFamily="34" charset="0"/>
-              </a:rPr>
-              <a:t>Reshit</a:t>
-            </a:r>
-            <a:r>
-              <a:rPr lang="en-US" sz="1400" dirty="0">
-                <a:solidFill>
-                  <a:srgbClr val="FDCB95"/>
-                </a:solidFill>
-                <a:latin typeface="Bahnschrift Light SemiCondensed" panose="020B0502040204020203" pitchFamily="34" charset="0"/>
-              </a:rPr>
-              <a:t> Carmel 		| 		2025</a:t>
+              <a:t>DBMS Final Assignment		 | 		Michal Berkheim, Michal Lahav, Reshit Carmel 		| 		2025</a:t>
             </a:r>
             <a:endParaRPr lang="he-IL" sz="1400" dirty="0">
               <a:solidFill>
@@ -5138,7 +5120,7 @@
               <a:lstStyle/>
               <a:p>
                 <a:pPr algn="ctr"/>
-                <a:endParaRPr lang="he-IL"/>
+                <a:endParaRPr lang="he-IL" dirty="0"/>
               </a:p>
             </p:txBody>
           </p:sp>
@@ -5752,7 +5734,7 @@
                 </a:solidFill>
                 <a:latin typeface="Bahnschrift Light" panose="020B0502040204020203" pitchFamily="34" charset="0"/>
               </a:rPr>
-              <a:t>The index we created on release year and popularity supports efficient execution of this query.</a:t>
+              <a:t>The indexes we created on release year and popularity support efficient execution of this query.</a:t>
             </a:r>
           </a:p>
           <a:p>
@@ -6341,7 +6323,7 @@
                 </a:solidFill>
                 <a:latin typeface="Bahnschrift Light" panose="020B0502040204020203" pitchFamily="34" charset="0"/>
               </a:rPr>
-              <a:t>The indexes we created on release year, popularity and vote average supports efficient execution of this query.</a:t>
+              <a:t>The indexes we created on release year, popularity and vote average support efficient execution of this query.</a:t>
             </a:r>
           </a:p>
           <a:p>
@@ -6942,7 +6924,28 @@
                 </a:solidFill>
                 <a:latin typeface="Bahnschrift Light" panose="020B0502040204020203" pitchFamily="34" charset="0"/>
               </a:rPr>
-              <a:t>We used the TMDB API, which provides information on over a million movies. </a:t>
+              <a:t>We used the </a:t>
+            </a:r>
+            <a:r>
+              <a:rPr lang="en-US" sz="1400" b="1" dirty="0">
+                <a:solidFill>
+                  <a:srgbClr val="FDCB95"/>
+                </a:solidFill>
+                <a:latin typeface="Bahnschrift SemiBold" panose="020B0502040204020203" pitchFamily="34" charset="0"/>
+              </a:rPr>
+              <a:t>TMDB API</a:t>
+            </a:r>
+            <a:r>
+              <a:rPr lang="en-US" sz="1400" dirty="0">
+                <a:solidFill>
+                  <a:schemeClr val="accent4">
+                    <a:lumMod val="40000"/>
+                    <a:lumOff val="60000"/>
+                  </a:schemeClr>
+                </a:solidFill>
+                <a:latin typeface="Bahnschrift Light" panose="020B0502040204020203" pitchFamily="34" charset="0"/>
+              </a:rPr>
+              <a:t>, which provides information on over a million movies. </a:t>
             </a:r>
           </a:p>
           <a:p>
@@ -7001,6 +7004,96 @@
                 <a:latin typeface="Bahnschrift Light" panose="020B0502040204020203" pitchFamily="34" charset="0"/>
               </a:rPr>
               <a:t>In the api_data_retrieve.py file, the API retrieves top-ranked comedy films that have received at least 500 votes (ensuring their ranking is reliable). Various functions populate the tables with the relevant movie data.</a:t>
+            </a:r>
+          </a:p>
+          <a:p>
+            <a:pPr marL="285750" indent="-285750">
+              <a:spcBef>
+                <a:spcPts val="600"/>
+              </a:spcBef>
+              <a:buFont typeface="Arial" panose="020B0604020202020204" pitchFamily="34" charset="0"/>
+              <a:buChar char="•"/>
+            </a:pPr>
+            <a:r>
+              <a:rPr lang="en-US" sz="1400" dirty="0">
+                <a:solidFill>
+                  <a:schemeClr val="accent4">
+                    <a:lumMod val="40000"/>
+                    <a:lumOff val="60000"/>
+                  </a:schemeClr>
+                </a:solidFill>
+                <a:latin typeface="Bahnschrift Light" panose="020B0502040204020203" pitchFamily="34" charset="0"/>
+              </a:rPr>
+              <a:t>As the actors, directors and keywords lists in TMDB are sorted by importance (with the main actors and the most relevant keywords appearing first), we chose to include only the first 5 listed actors (they played </a:t>
+            </a:r>
+            <a:r>
+              <a:rPr lang="en-US" sz="1400" b="1" dirty="0">
+                <a:solidFill>
+                  <a:schemeClr val="accent4">
+                    <a:lumMod val="40000"/>
+                    <a:lumOff val="60000"/>
+                  </a:schemeClr>
+                </a:solidFill>
+                <a:latin typeface="Bahnschrift Light" panose="020B0502040204020203" pitchFamily="34" charset="0"/>
+              </a:rPr>
+              <a:t>the main roles</a:t>
+            </a:r>
+            <a:r>
+              <a:rPr lang="en-US" sz="1400" dirty="0">
+                <a:solidFill>
+                  <a:schemeClr val="accent4">
+                    <a:lumMod val="40000"/>
+                    <a:lumOff val="60000"/>
+                  </a:schemeClr>
+                </a:solidFill>
+                <a:latin typeface="Bahnschrift Light" panose="020B0502040204020203" pitchFamily="34" charset="0"/>
+              </a:rPr>
+              <a:t>), the first listed director (</a:t>
+            </a:r>
+            <a:r>
+              <a:rPr lang="en-US" sz="1400" b="1" dirty="0">
+                <a:solidFill>
+                  <a:schemeClr val="accent4">
+                    <a:lumMod val="40000"/>
+                    <a:lumOff val="60000"/>
+                  </a:schemeClr>
+                </a:solidFill>
+                <a:latin typeface="Bahnschrift Light" panose="020B0502040204020203" pitchFamily="34" charset="0"/>
+              </a:rPr>
+              <a:t>the main one</a:t>
+            </a:r>
+            <a:r>
+              <a:rPr lang="en-US" sz="1400" dirty="0">
+                <a:solidFill>
+                  <a:schemeClr val="accent4">
+                    <a:lumMod val="40000"/>
+                    <a:lumOff val="60000"/>
+                  </a:schemeClr>
+                </a:solidFill>
+                <a:latin typeface="Bahnschrift Light" panose="020B0502040204020203" pitchFamily="34" charset="0"/>
+              </a:rPr>
+              <a:t>), and the first 5 listed keywords of each movie. </a:t>
+            </a:r>
+          </a:p>
+          <a:p>
+            <a:pPr marL="742950" lvl="1" indent="-285750">
+              <a:spcBef>
+                <a:spcPts val="600"/>
+              </a:spcBef>
+              <a:buFont typeface="Arial" panose="020B0604020202020204" pitchFamily="34" charset="0"/>
+              <a:buChar char="•"/>
+            </a:pPr>
+            <a:r>
+              <a:rPr lang="en-US" sz="1400" dirty="0">
+                <a:solidFill>
+                  <a:schemeClr val="accent4">
+                    <a:lumMod val="40000"/>
+                    <a:lumOff val="60000"/>
+                  </a:schemeClr>
+                </a:solidFill>
+                <a:latin typeface="Bahnschrift Light" panose="020B0502040204020203" pitchFamily="34" charset="0"/>
+              </a:rPr>
+              <a:t>including every keyword for every movie makes the keyword table by far the largest one, and this is a project about movies… 🤓</a:t>
             </a:r>
           </a:p>
           <a:p>
@@ -7230,7 +7323,7 @@
             <a:lstStyle/>
             <a:p>
               <a:pPr algn="ctr"/>
-              <a:endParaRPr lang="he-IL"/>
+              <a:endParaRPr lang="he-IL" dirty="0"/>
             </a:p>
           </p:txBody>
         </p:sp>
@@ -7413,8 +7506,8 @@
         </p:blipFill>
         <p:spPr>
           <a:xfrm>
-            <a:off x="1328738" y="1179094"/>
-            <a:ext cx="6486524" cy="3584658"/>
+            <a:off x="1088912" y="914023"/>
+            <a:ext cx="6966176" cy="3849729"/>
           </a:xfrm>
           <a:prstGeom prst="rect">
             <a:avLst/>
@@ -7567,7 +7660,7 @@
               <a:t>Movie(</a:t>
             </a:r>
             <a:r>
-              <a:rPr lang="en-US" sz="1400" dirty="0" err="1">
+              <a:rPr lang="en-US" sz="1400" b="1" u="sng" dirty="0">
                 <a:solidFill>
                   <a:schemeClr val="accent4">
                     <a:lumMod val="40000"/>
@@ -7588,103 +7681,7 @@
                 </a:solidFill>
                 <a:latin typeface="Bahnschrift Light" panose="020B0502040204020203" pitchFamily="34" charset="0"/>
               </a:rPr>
-              <a:t>, Title, </a:t>
-            </a:r>
-            <a:r>
-              <a:rPr lang="en-US" sz="1400" dirty="0" err="1">
-                <a:solidFill>
-                  <a:schemeClr val="accent4">
-                    <a:lumMod val="40000"/>
-                    <a:lumOff val="60000"/>
-                  </a:schemeClr>
-                </a:solidFill>
-                <a:latin typeface="Bahnschrift Light" panose="020B0502040204020203" pitchFamily="34" charset="0"/>
-              </a:rPr>
-              <a:t>Director_id</a:t>
-            </a:r>
-            <a:r>
-              <a:rPr lang="en-US" sz="1400" dirty="0">
-                <a:solidFill>
-                  <a:schemeClr val="accent4">
-                    <a:lumMod val="40000"/>
-                    <a:lumOff val="60000"/>
-                  </a:schemeClr>
-                </a:solidFill>
-                <a:latin typeface="Bahnschrift Light" panose="020B0502040204020203" pitchFamily="34" charset="0"/>
-              </a:rPr>
-              <a:t>, </a:t>
-            </a:r>
-            <a:r>
-              <a:rPr lang="en-US" sz="1400" dirty="0" err="1">
-                <a:solidFill>
-                  <a:schemeClr val="accent4">
-                    <a:lumMod val="40000"/>
-                    <a:lumOff val="60000"/>
-                  </a:schemeClr>
-                </a:solidFill>
-                <a:latin typeface="Bahnschrift Light" panose="020B0502040204020203" pitchFamily="34" charset="0"/>
-              </a:rPr>
-              <a:t>Release_year</a:t>
-            </a:r>
-            <a:r>
-              <a:rPr lang="en-US" sz="1400" dirty="0">
-                <a:solidFill>
-                  <a:schemeClr val="accent4">
-                    <a:lumMod val="40000"/>
-                    <a:lumOff val="60000"/>
-                  </a:schemeClr>
-                </a:solidFill>
-                <a:latin typeface="Bahnschrift Light" panose="020B0502040204020203" pitchFamily="34" charset="0"/>
-              </a:rPr>
-              <a:t>, Runtime, Overview, Popularity, 				</a:t>
-            </a:r>
-            <a:r>
-              <a:rPr lang="en-US" sz="1400" dirty="0" err="1">
-                <a:solidFill>
-                  <a:schemeClr val="accent4">
-                    <a:lumMod val="40000"/>
-                    <a:lumOff val="60000"/>
-                  </a:schemeClr>
-                </a:solidFill>
-                <a:latin typeface="Bahnschrift Light" panose="020B0502040204020203" pitchFamily="34" charset="0"/>
-              </a:rPr>
-              <a:t>Vote_average</a:t>
-            </a:r>
-            <a:r>
-              <a:rPr lang="en-US" sz="1400" dirty="0">
-                <a:solidFill>
-                  <a:schemeClr val="accent4">
-                    <a:lumMod val="40000"/>
-                    <a:lumOff val="60000"/>
-                  </a:schemeClr>
-                </a:solidFill>
-                <a:latin typeface="Bahnschrift Light" panose="020B0502040204020203" pitchFamily="34" charset="0"/>
-              </a:rPr>
-              <a:t>, </a:t>
-            </a:r>
-            <a:r>
-              <a:rPr lang="en-US" sz="1400" dirty="0" err="1">
-                <a:solidFill>
-                  <a:schemeClr val="accent4">
-                    <a:lumMod val="40000"/>
-                    <a:lumOff val="60000"/>
-                  </a:schemeClr>
-                </a:solidFill>
-                <a:latin typeface="Bahnschrift Light" panose="020B0502040204020203" pitchFamily="34" charset="0"/>
-              </a:rPr>
-              <a:t>Vote_count</a:t>
-            </a:r>
-            <a:r>
-              <a:rPr lang="en-US" sz="1400" dirty="0">
-                <a:solidFill>
-                  <a:schemeClr val="accent4">
-                    <a:lumMod val="40000"/>
-                    <a:lumOff val="60000"/>
-                  </a:schemeClr>
-                </a:solidFill>
-                <a:latin typeface="Bahnschrift Light" panose="020B0502040204020203" pitchFamily="34" charset="0"/>
-              </a:rPr>
-              <a:t>)</a:t>
+              <a:t>, Title, Director_id, Release_year, Runtime, Overview, Popularity, 				Vote_average, Vote_count)</a:t>
             </a:r>
           </a:p>
           <a:p>
@@ -7708,7 +7705,7 @@
               <a:t>Person(</a:t>
             </a:r>
             <a:r>
-              <a:rPr lang="en-US" sz="1400" dirty="0" err="1">
+              <a:rPr lang="en-US" sz="1400" b="1" u="sng" dirty="0">
                 <a:solidFill>
                   <a:schemeClr val="accent4">
                     <a:lumMod val="40000"/>
@@ -7729,31 +7726,7 @@
                 </a:solidFill>
                 <a:latin typeface="Bahnschrift Light" panose="020B0502040204020203" pitchFamily="34" charset="0"/>
               </a:rPr>
-              <a:t>, </a:t>
-            </a:r>
-            <a:r>
-              <a:rPr lang="en-US" sz="1400" dirty="0" err="1">
-                <a:solidFill>
-                  <a:schemeClr val="accent4">
-                    <a:lumMod val="40000"/>
-                    <a:lumOff val="60000"/>
-                  </a:schemeClr>
-                </a:solidFill>
-                <a:latin typeface="Bahnschrift Light" panose="020B0502040204020203" pitchFamily="34" charset="0"/>
-              </a:rPr>
-              <a:t>Person_name</a:t>
-            </a:r>
-            <a:r>
-              <a:rPr lang="en-US" sz="1400" dirty="0">
-                <a:solidFill>
-                  <a:schemeClr val="accent4">
-                    <a:lumMod val="40000"/>
-                    <a:lumOff val="60000"/>
-                  </a:schemeClr>
-                </a:solidFill>
-                <a:latin typeface="Bahnschrift Light" panose="020B0502040204020203" pitchFamily="34" charset="0"/>
-              </a:rPr>
-              <a:t>, Birthday)</a:t>
+              <a:t>, Person_name, Birthday)</a:t>
             </a:r>
           </a:p>
           <a:p>
@@ -7777,7 +7750,7 @@
               <a:t>Actor(</a:t>
             </a:r>
             <a:r>
-              <a:rPr lang="en-US" sz="1400" dirty="0" err="1">
+              <a:rPr lang="en-US" sz="1400" b="1" u="sng" dirty="0">
                 <a:solidFill>
                   <a:schemeClr val="accent4">
                     <a:lumMod val="40000"/>
@@ -7822,7 +7795,7 @@
               <a:t>Director(</a:t>
             </a:r>
             <a:r>
-              <a:rPr lang="en-US" sz="1400" dirty="0" err="1">
+              <a:rPr lang="en-US" sz="1400" b="1" u="sng" dirty="0">
                 <a:solidFill>
                   <a:schemeClr val="accent4">
                     <a:lumMod val="40000"/>
@@ -7867,40 +7840,16 @@
               <a:t>Movie-person(</a:t>
             </a:r>
             <a:r>
-              <a:rPr lang="en-US" sz="1400" dirty="0" err="1">
-                <a:solidFill>
-                  <a:schemeClr val="accent4">
-                    <a:lumMod val="40000"/>
-                    <a:lumOff val="60000"/>
-                  </a:schemeClr>
-                </a:solidFill>
-                <a:latin typeface="Bahnschrift Light" panose="020B0502040204020203" pitchFamily="34" charset="0"/>
-              </a:rPr>
-              <a:t>Movie_id</a:t>
-            </a:r>
-            <a:r>
-              <a:rPr lang="en-US" sz="1400" dirty="0">
-                <a:solidFill>
-                  <a:schemeClr val="accent4">
-                    <a:lumMod val="40000"/>
-                    <a:lumOff val="60000"/>
-                  </a:schemeClr>
-                </a:solidFill>
-                <a:latin typeface="Bahnschrift Light" panose="020B0502040204020203" pitchFamily="34" charset="0"/>
-              </a:rPr>
-              <a:t>, </a:t>
-            </a:r>
-            <a:r>
-              <a:rPr lang="en-US" sz="1400" dirty="0" err="1">
-                <a:solidFill>
-                  <a:schemeClr val="accent4">
-                    <a:lumMod val="40000"/>
-                    <a:lumOff val="60000"/>
-                  </a:schemeClr>
-                </a:solidFill>
-                <a:latin typeface="Bahnschrift Light" panose="020B0502040204020203" pitchFamily="34" charset="0"/>
-              </a:rPr>
-              <a:t>Person_id</a:t>
+              <a:rPr lang="en-US" sz="1400" b="1" u="sng" dirty="0">
+                <a:solidFill>
+                  <a:schemeClr val="accent4">
+                    <a:lumMod val="40000"/>
+                    <a:lumOff val="60000"/>
+                  </a:schemeClr>
+                </a:solidFill>
+                <a:latin typeface="Bahnschrift Light" panose="020B0502040204020203" pitchFamily="34" charset="0"/>
+              </a:rPr>
+              <a:t>Movie_id, Person_id</a:t>
             </a:r>
             <a:r>
               <a:rPr lang="en-US" sz="1400" dirty="0">
@@ -7936,7 +7885,7 @@
               <a:t>Genre(</a:t>
             </a:r>
             <a:r>
-              <a:rPr lang="en-US" sz="1400" dirty="0" err="1">
+              <a:rPr lang="en-US" sz="1400" b="1" u="sng" dirty="0">
                 <a:solidFill>
                   <a:schemeClr val="accent4">
                     <a:lumMod val="40000"/>
@@ -7957,31 +7906,7 @@
                 </a:solidFill>
                 <a:latin typeface="Bahnschrift Light" panose="020B0502040204020203" pitchFamily="34" charset="0"/>
               </a:rPr>
-              <a:t>, </a:t>
-            </a:r>
-            <a:r>
-              <a:rPr lang="en-US" sz="1400" dirty="0" err="1">
-                <a:solidFill>
-                  <a:schemeClr val="accent4">
-                    <a:lumMod val="40000"/>
-                    <a:lumOff val="60000"/>
-                  </a:schemeClr>
-                </a:solidFill>
-                <a:latin typeface="Bahnschrift Light" panose="020B0502040204020203" pitchFamily="34" charset="0"/>
-              </a:rPr>
-              <a:t>Genre_name</a:t>
-            </a:r>
-            <a:r>
-              <a:rPr lang="en-US" sz="1400" dirty="0">
-                <a:solidFill>
-                  <a:schemeClr val="accent4">
-                    <a:lumMod val="40000"/>
-                    <a:lumOff val="60000"/>
-                  </a:schemeClr>
-                </a:solidFill>
-                <a:latin typeface="Bahnschrift Light" panose="020B0502040204020203" pitchFamily="34" charset="0"/>
-              </a:rPr>
-              <a:t>)</a:t>
+              <a:t>, Genre_name)</a:t>
             </a:r>
           </a:p>
           <a:p>
@@ -8005,40 +7930,16 @@
               <a:t>Movie-genre(</a:t>
             </a:r>
             <a:r>
-              <a:rPr lang="en-US" sz="1400" dirty="0" err="1">
-                <a:solidFill>
-                  <a:schemeClr val="accent4">
-                    <a:lumMod val="40000"/>
-                    <a:lumOff val="60000"/>
-                  </a:schemeClr>
-                </a:solidFill>
-                <a:latin typeface="Bahnschrift Light" panose="020B0502040204020203" pitchFamily="34" charset="0"/>
-              </a:rPr>
-              <a:t>Movie_id</a:t>
-            </a:r>
-            <a:r>
-              <a:rPr lang="en-US" sz="1400" dirty="0">
-                <a:solidFill>
-                  <a:schemeClr val="accent4">
-                    <a:lumMod val="40000"/>
-                    <a:lumOff val="60000"/>
-                  </a:schemeClr>
-                </a:solidFill>
-                <a:latin typeface="Bahnschrift Light" panose="020B0502040204020203" pitchFamily="34" charset="0"/>
-              </a:rPr>
-              <a:t>, </a:t>
-            </a:r>
-            <a:r>
-              <a:rPr lang="en-US" sz="1400" dirty="0" err="1">
-                <a:solidFill>
-                  <a:schemeClr val="accent4">
-                    <a:lumMod val="40000"/>
-                    <a:lumOff val="60000"/>
-                  </a:schemeClr>
-                </a:solidFill>
-                <a:latin typeface="Bahnschrift Light" panose="020B0502040204020203" pitchFamily="34" charset="0"/>
-              </a:rPr>
-              <a:t>Genre_id</a:t>
+              <a:rPr lang="en-US" sz="1400" b="1" u="sng" dirty="0">
+                <a:solidFill>
+                  <a:schemeClr val="accent4">
+                    <a:lumMod val="40000"/>
+                    <a:lumOff val="60000"/>
+                  </a:schemeClr>
+                </a:solidFill>
+                <a:latin typeface="Bahnschrift Light" panose="020B0502040204020203" pitchFamily="34" charset="0"/>
+              </a:rPr>
+              <a:t>Movie_id, Genre_id</a:t>
             </a:r>
             <a:r>
               <a:rPr lang="en-US" sz="1400" dirty="0">
@@ -8071,10 +7972,10 @@
                 </a:solidFill>
                 <a:latin typeface="Bahnschrift Light" panose="020B0502040204020203" pitchFamily="34" charset="0"/>
               </a:rPr>
-              <a:t>Keywords(</a:t>
-            </a:r>
-            <a:r>
-              <a:rPr lang="en-US" sz="1400" dirty="0" err="1">
+              <a:t>Keyword(</a:t>
+            </a:r>
+            <a:r>
+              <a:rPr lang="en-US" sz="1400" b="1" u="sng" dirty="0">
                 <a:solidFill>
                   <a:schemeClr val="accent4">
                     <a:lumMod val="40000"/>
@@ -8095,31 +7996,7 @@
                 </a:solidFill>
                 <a:latin typeface="Bahnschrift Light" panose="020B0502040204020203" pitchFamily="34" charset="0"/>
               </a:rPr>
-              <a:t>, </a:t>
-            </a:r>
-            <a:r>
-              <a:rPr lang="en-US" sz="1400" dirty="0" err="1">
-                <a:solidFill>
-                  <a:schemeClr val="accent4">
-                    <a:lumMod val="40000"/>
-                    <a:lumOff val="60000"/>
-                  </a:schemeClr>
-                </a:solidFill>
-                <a:latin typeface="Bahnschrift Light" panose="020B0502040204020203" pitchFamily="34" charset="0"/>
-              </a:rPr>
-              <a:t>Keyword_name</a:t>
-            </a:r>
-            <a:r>
-              <a:rPr lang="en-US" sz="1400" dirty="0">
-                <a:solidFill>
-                  <a:schemeClr val="accent4">
-                    <a:lumMod val="40000"/>
-                    <a:lumOff val="60000"/>
-                  </a:schemeClr>
-                </a:solidFill>
-                <a:latin typeface="Bahnschrift Light" panose="020B0502040204020203" pitchFamily="34" charset="0"/>
-              </a:rPr>
-              <a:t>)</a:t>
+              <a:t>, Keyword_name)</a:t>
             </a:r>
           </a:p>
           <a:p>
@@ -8143,40 +8020,16 @@
               <a:t>Movie-keyword(</a:t>
             </a:r>
             <a:r>
-              <a:rPr lang="en-US" sz="1400" dirty="0" err="1">
-                <a:solidFill>
-                  <a:schemeClr val="accent4">
-                    <a:lumMod val="40000"/>
-                    <a:lumOff val="60000"/>
-                  </a:schemeClr>
-                </a:solidFill>
-                <a:latin typeface="Bahnschrift Light" panose="020B0502040204020203" pitchFamily="34" charset="0"/>
-              </a:rPr>
-              <a:t>Movie_id</a:t>
-            </a:r>
-            <a:r>
-              <a:rPr lang="en-US" sz="1400" dirty="0">
-                <a:solidFill>
-                  <a:schemeClr val="accent4">
-                    <a:lumMod val="40000"/>
-                    <a:lumOff val="60000"/>
-                  </a:schemeClr>
-                </a:solidFill>
-                <a:latin typeface="Bahnschrift Light" panose="020B0502040204020203" pitchFamily="34" charset="0"/>
-              </a:rPr>
-              <a:t>, </a:t>
-            </a:r>
-            <a:r>
-              <a:rPr lang="en-US" sz="1400" dirty="0" err="1">
-                <a:solidFill>
-                  <a:schemeClr val="accent4">
-                    <a:lumMod val="40000"/>
-                    <a:lumOff val="60000"/>
-                  </a:schemeClr>
-                </a:solidFill>
-                <a:latin typeface="Bahnschrift Light" panose="020B0502040204020203" pitchFamily="34" charset="0"/>
-              </a:rPr>
-              <a:t>Keyword_id</a:t>
+              <a:rPr lang="en-US" sz="1400" b="1" u="sng" dirty="0">
+                <a:solidFill>
+                  <a:schemeClr val="accent4">
+                    <a:lumMod val="40000"/>
+                    <a:lumOff val="60000"/>
+                  </a:schemeClr>
+                </a:solidFill>
+                <a:latin typeface="Bahnschrift Light" panose="020B0502040204020203" pitchFamily="34" charset="0"/>
+              </a:rPr>
+              <a:t>Movie_id, Keyword_id</a:t>
             </a:r>
             <a:r>
               <a:rPr lang="en-US" sz="1400" dirty="0">
@@ -8405,55 +8258,7 @@
                 </a:solidFill>
                 <a:latin typeface="Bahnschrift Light" panose="020B0502040204020203" pitchFamily="34" charset="0"/>
               </a:rPr>
-              <a:t>Movie(</a:t>
-            </a:r>
-            <a:r>
-              <a:rPr lang="en-US" sz="1400" dirty="0" err="1">
-                <a:solidFill>
-                  <a:schemeClr val="accent4">
-                    <a:lumMod val="40000"/>
-                    <a:lumOff val="60000"/>
-                  </a:schemeClr>
-                </a:solidFill>
-                <a:latin typeface="Bahnschrift Light" panose="020B0502040204020203" pitchFamily="34" charset="0"/>
-              </a:rPr>
-              <a:t>Director_id</a:t>
-            </a:r>
-            <a:r>
-              <a:rPr lang="en-US" sz="1400" dirty="0">
-                <a:solidFill>
-                  <a:schemeClr val="accent4">
-                    <a:lumMod val="40000"/>
-                    <a:lumOff val="60000"/>
-                  </a:schemeClr>
-                </a:solidFill>
-                <a:latin typeface="Bahnschrift Light" panose="020B0502040204020203" pitchFamily="34" charset="0"/>
-              </a:rPr>
-              <a:t>) → Director(</a:t>
-            </a:r>
-            <a:r>
-              <a:rPr lang="en-US" sz="1400" dirty="0" err="1">
-                <a:solidFill>
-                  <a:schemeClr val="accent4">
-                    <a:lumMod val="40000"/>
-                    <a:lumOff val="60000"/>
-                  </a:schemeClr>
-                </a:solidFill>
-                <a:latin typeface="Bahnschrift Light" panose="020B0502040204020203" pitchFamily="34" charset="0"/>
-              </a:rPr>
-              <a:t>Director_id</a:t>
-            </a:r>
-            <a:r>
-              <a:rPr lang="en-US" sz="1400" dirty="0">
-                <a:solidFill>
-                  <a:schemeClr val="accent4">
-                    <a:lumMod val="40000"/>
-                    <a:lumOff val="60000"/>
-                  </a:schemeClr>
-                </a:solidFill>
-                <a:latin typeface="Bahnschrift Light" panose="020B0502040204020203" pitchFamily="34" charset="0"/>
-              </a:rPr>
-              <a:t>)</a:t>
+              <a:t>Movie(Director_id) → Director(Director_id)</a:t>
             </a:r>
           </a:p>
           <a:p>
@@ -8474,55 +8279,7 @@
                 </a:solidFill>
                 <a:latin typeface="Bahnschrift Light" panose="020B0502040204020203" pitchFamily="34" charset="0"/>
               </a:rPr>
-              <a:t>Actor(</a:t>
-            </a:r>
-            <a:r>
-              <a:rPr lang="en-US" sz="1400" dirty="0" err="1">
-                <a:solidFill>
-                  <a:schemeClr val="accent4">
-                    <a:lumMod val="40000"/>
-                    <a:lumOff val="60000"/>
-                  </a:schemeClr>
-                </a:solidFill>
-                <a:latin typeface="Bahnschrift Light" panose="020B0502040204020203" pitchFamily="34" charset="0"/>
-              </a:rPr>
-              <a:t>Actor_id</a:t>
-            </a:r>
-            <a:r>
-              <a:rPr lang="en-US" sz="1400" dirty="0">
-                <a:solidFill>
-                  <a:schemeClr val="accent4">
-                    <a:lumMod val="40000"/>
-                    <a:lumOff val="60000"/>
-                  </a:schemeClr>
-                </a:solidFill>
-                <a:latin typeface="Bahnschrift Light" panose="020B0502040204020203" pitchFamily="34" charset="0"/>
-              </a:rPr>
-              <a:t>) → Person(</a:t>
-            </a:r>
-            <a:r>
-              <a:rPr lang="en-US" sz="1400" dirty="0" err="1">
-                <a:solidFill>
-                  <a:schemeClr val="accent4">
-                    <a:lumMod val="40000"/>
-                    <a:lumOff val="60000"/>
-                  </a:schemeClr>
-                </a:solidFill>
-                <a:latin typeface="Bahnschrift Light" panose="020B0502040204020203" pitchFamily="34" charset="0"/>
-              </a:rPr>
-              <a:t>Person_id</a:t>
-            </a:r>
-            <a:r>
-              <a:rPr lang="en-US" sz="1400" dirty="0">
-                <a:solidFill>
-                  <a:schemeClr val="accent4">
-                    <a:lumMod val="40000"/>
-                    <a:lumOff val="60000"/>
-                  </a:schemeClr>
-                </a:solidFill>
-                <a:latin typeface="Bahnschrift Light" panose="020B0502040204020203" pitchFamily="34" charset="0"/>
-              </a:rPr>
-              <a:t>)</a:t>
+              <a:t>Actor(Actor_id) → Person(Person_id)</a:t>
             </a:r>
           </a:p>
           <a:p>
@@ -8543,55 +8300,7 @@
                 </a:solidFill>
                 <a:latin typeface="Bahnschrift Light" panose="020B0502040204020203" pitchFamily="34" charset="0"/>
               </a:rPr>
-              <a:t>Director(</a:t>
-            </a:r>
-            <a:r>
-              <a:rPr lang="en-US" sz="1400" dirty="0" err="1">
-                <a:solidFill>
-                  <a:schemeClr val="accent4">
-                    <a:lumMod val="40000"/>
-                    <a:lumOff val="60000"/>
-                  </a:schemeClr>
-                </a:solidFill>
-                <a:latin typeface="Bahnschrift Light" panose="020B0502040204020203" pitchFamily="34" charset="0"/>
-              </a:rPr>
-              <a:t>Director_id</a:t>
-            </a:r>
-            <a:r>
-              <a:rPr lang="en-US" sz="1400" dirty="0">
-                <a:solidFill>
-                  <a:schemeClr val="accent4">
-                    <a:lumMod val="40000"/>
-                    <a:lumOff val="60000"/>
-                  </a:schemeClr>
-                </a:solidFill>
-                <a:latin typeface="Bahnschrift Light" panose="020B0502040204020203" pitchFamily="34" charset="0"/>
-              </a:rPr>
-              <a:t>) → Person(</a:t>
-            </a:r>
-            <a:r>
-              <a:rPr lang="en-US" sz="1400" dirty="0" err="1">
-                <a:solidFill>
-                  <a:schemeClr val="accent4">
-                    <a:lumMod val="40000"/>
-                    <a:lumOff val="60000"/>
-                  </a:schemeClr>
-                </a:solidFill>
-                <a:latin typeface="Bahnschrift Light" panose="020B0502040204020203" pitchFamily="34" charset="0"/>
-              </a:rPr>
-              <a:t>Person_id</a:t>
-            </a:r>
-            <a:r>
-              <a:rPr lang="en-US" sz="1400" dirty="0">
-                <a:solidFill>
-                  <a:schemeClr val="accent4">
-                    <a:lumMod val="40000"/>
-                    <a:lumOff val="60000"/>
-                  </a:schemeClr>
-                </a:solidFill>
-                <a:latin typeface="Bahnschrift Light" panose="020B0502040204020203" pitchFamily="34" charset="0"/>
-              </a:rPr>
-              <a:t>)</a:t>
+              <a:t>Director(Director_id) → Person(Person_id)</a:t>
             </a:r>
           </a:p>
           <a:p>
@@ -8612,55 +8321,7 @@
                 </a:solidFill>
                 <a:latin typeface="Bahnschrift Light" panose="020B0502040204020203" pitchFamily="34" charset="0"/>
               </a:rPr>
-              <a:t>Movie-person(</a:t>
-            </a:r>
-            <a:r>
-              <a:rPr lang="en-US" sz="1400" dirty="0" err="1">
-                <a:solidFill>
-                  <a:schemeClr val="accent4">
-                    <a:lumMod val="40000"/>
-                    <a:lumOff val="60000"/>
-                  </a:schemeClr>
-                </a:solidFill>
-                <a:latin typeface="Bahnschrift Light" panose="020B0502040204020203" pitchFamily="34" charset="0"/>
-              </a:rPr>
-              <a:t>Movie_id</a:t>
-            </a:r>
-            <a:r>
-              <a:rPr lang="en-US" sz="1400" dirty="0">
-                <a:solidFill>
-                  <a:schemeClr val="accent4">
-                    <a:lumMod val="40000"/>
-                    <a:lumOff val="60000"/>
-                  </a:schemeClr>
-                </a:solidFill>
-                <a:latin typeface="Bahnschrift Light" panose="020B0502040204020203" pitchFamily="34" charset="0"/>
-              </a:rPr>
-              <a:t>) → Movie(</a:t>
-            </a:r>
-            <a:r>
-              <a:rPr lang="en-US" sz="1400" dirty="0" err="1">
-                <a:solidFill>
-                  <a:schemeClr val="accent4">
-                    <a:lumMod val="40000"/>
-                    <a:lumOff val="60000"/>
-                  </a:schemeClr>
-                </a:solidFill>
-                <a:latin typeface="Bahnschrift Light" panose="020B0502040204020203" pitchFamily="34" charset="0"/>
-              </a:rPr>
-              <a:t>Movie_id</a:t>
-            </a:r>
-            <a:r>
-              <a:rPr lang="en-US" sz="1400" dirty="0">
-                <a:solidFill>
-                  <a:schemeClr val="accent4">
-                    <a:lumMod val="40000"/>
-                    <a:lumOff val="60000"/>
-                  </a:schemeClr>
-                </a:solidFill>
-                <a:latin typeface="Bahnschrift Light" panose="020B0502040204020203" pitchFamily="34" charset="0"/>
-              </a:rPr>
-              <a:t>)</a:t>
+              <a:t>Movie-person(Movie_id) → Movie(Movie_id)</a:t>
             </a:r>
           </a:p>
           <a:p>
@@ -8681,55 +8342,7 @@
                 </a:solidFill>
                 <a:latin typeface="Bahnschrift Light" panose="020B0502040204020203" pitchFamily="34" charset="0"/>
               </a:rPr>
-              <a:t>Movie-person(</a:t>
-            </a:r>
-            <a:r>
-              <a:rPr lang="en-US" sz="1400" dirty="0" err="1">
-                <a:solidFill>
-                  <a:schemeClr val="accent4">
-                    <a:lumMod val="40000"/>
-                    <a:lumOff val="60000"/>
-                  </a:schemeClr>
-                </a:solidFill>
-                <a:latin typeface="Bahnschrift Light" panose="020B0502040204020203" pitchFamily="34" charset="0"/>
-              </a:rPr>
-              <a:t>Person_id</a:t>
-            </a:r>
-            <a:r>
-              <a:rPr lang="en-US" sz="1400" dirty="0">
-                <a:solidFill>
-                  <a:schemeClr val="accent4">
-                    <a:lumMod val="40000"/>
-                    <a:lumOff val="60000"/>
-                  </a:schemeClr>
-                </a:solidFill>
-                <a:latin typeface="Bahnschrift Light" panose="020B0502040204020203" pitchFamily="34" charset="0"/>
-              </a:rPr>
-              <a:t>) → Person(</a:t>
-            </a:r>
-            <a:r>
-              <a:rPr lang="en-US" sz="1400" dirty="0" err="1">
-                <a:solidFill>
-                  <a:schemeClr val="accent4">
-                    <a:lumMod val="40000"/>
-                    <a:lumOff val="60000"/>
-                  </a:schemeClr>
-                </a:solidFill>
-                <a:latin typeface="Bahnschrift Light" panose="020B0502040204020203" pitchFamily="34" charset="0"/>
-              </a:rPr>
-              <a:t>Person_id</a:t>
-            </a:r>
-            <a:r>
-              <a:rPr lang="en-US" sz="1400" dirty="0">
-                <a:solidFill>
-                  <a:schemeClr val="accent4">
-                    <a:lumMod val="40000"/>
-                    <a:lumOff val="60000"/>
-                  </a:schemeClr>
-                </a:solidFill>
-                <a:latin typeface="Bahnschrift Light" panose="020B0502040204020203" pitchFamily="34" charset="0"/>
-              </a:rPr>
-              <a:t>)</a:t>
+              <a:t>Movie-person(Person_id) → Person(Person_id)</a:t>
             </a:r>
           </a:p>
           <a:p>
@@ -8750,55 +8363,7 @@
                 </a:solidFill>
                 <a:latin typeface="Bahnschrift Light" panose="020B0502040204020203" pitchFamily="34" charset="0"/>
               </a:rPr>
-              <a:t>Movie-genre(</a:t>
-            </a:r>
-            <a:r>
-              <a:rPr lang="en-US" sz="1400" dirty="0" err="1">
-                <a:solidFill>
-                  <a:schemeClr val="accent4">
-                    <a:lumMod val="40000"/>
-                    <a:lumOff val="60000"/>
-                  </a:schemeClr>
-                </a:solidFill>
-                <a:latin typeface="Bahnschrift Light" panose="020B0502040204020203" pitchFamily="34" charset="0"/>
-              </a:rPr>
-              <a:t>Movie_id</a:t>
-            </a:r>
-            <a:r>
-              <a:rPr lang="en-US" sz="1400" dirty="0">
-                <a:solidFill>
-                  <a:schemeClr val="accent4">
-                    <a:lumMod val="40000"/>
-                    <a:lumOff val="60000"/>
-                  </a:schemeClr>
-                </a:solidFill>
-                <a:latin typeface="Bahnschrift Light" panose="020B0502040204020203" pitchFamily="34" charset="0"/>
-              </a:rPr>
-              <a:t>) → Movie(</a:t>
-            </a:r>
-            <a:r>
-              <a:rPr lang="en-US" sz="1400" dirty="0" err="1">
-                <a:solidFill>
-                  <a:schemeClr val="accent4">
-                    <a:lumMod val="40000"/>
-                    <a:lumOff val="60000"/>
-                  </a:schemeClr>
-                </a:solidFill>
-                <a:latin typeface="Bahnschrift Light" panose="020B0502040204020203" pitchFamily="34" charset="0"/>
-              </a:rPr>
-              <a:t>Movie_id</a:t>
-            </a:r>
-            <a:r>
-              <a:rPr lang="en-US" sz="1400" dirty="0">
-                <a:solidFill>
-                  <a:schemeClr val="accent4">
-                    <a:lumMod val="40000"/>
-                    <a:lumOff val="60000"/>
-                  </a:schemeClr>
-                </a:solidFill>
-                <a:latin typeface="Bahnschrift Light" panose="020B0502040204020203" pitchFamily="34" charset="0"/>
-              </a:rPr>
-              <a:t>)</a:t>
+              <a:t>Movie-genre(Movie_id) → Movie(Movie_id)</a:t>
             </a:r>
           </a:p>
           <a:p>
@@ -8819,55 +8384,7 @@
                 </a:solidFill>
                 <a:latin typeface="Bahnschrift Light" panose="020B0502040204020203" pitchFamily="34" charset="0"/>
               </a:rPr>
-              <a:t>Movie-genre(</a:t>
-            </a:r>
-            <a:r>
-              <a:rPr lang="en-US" sz="1400" dirty="0" err="1">
-                <a:solidFill>
-                  <a:schemeClr val="accent4">
-                    <a:lumMod val="40000"/>
-                    <a:lumOff val="60000"/>
-                  </a:schemeClr>
-                </a:solidFill>
-                <a:latin typeface="Bahnschrift Light" panose="020B0502040204020203" pitchFamily="34" charset="0"/>
-              </a:rPr>
-              <a:t>Genre_id</a:t>
-            </a:r>
-            <a:r>
-              <a:rPr lang="en-US" sz="1400" dirty="0">
-                <a:solidFill>
-                  <a:schemeClr val="accent4">
-                    <a:lumMod val="40000"/>
-                    <a:lumOff val="60000"/>
-                  </a:schemeClr>
-                </a:solidFill>
-                <a:latin typeface="Bahnschrift Light" panose="020B0502040204020203" pitchFamily="34" charset="0"/>
-              </a:rPr>
-              <a:t>) → Genre(</a:t>
-            </a:r>
-            <a:r>
-              <a:rPr lang="en-US" sz="1400" dirty="0" err="1">
-                <a:solidFill>
-                  <a:schemeClr val="accent4">
-                    <a:lumMod val="40000"/>
-                    <a:lumOff val="60000"/>
-                  </a:schemeClr>
-                </a:solidFill>
-                <a:latin typeface="Bahnschrift Light" panose="020B0502040204020203" pitchFamily="34" charset="0"/>
-              </a:rPr>
-              <a:t>Genre_id</a:t>
-            </a:r>
-            <a:r>
-              <a:rPr lang="en-US" sz="1400" dirty="0">
-                <a:solidFill>
-                  <a:schemeClr val="accent4">
-                    <a:lumMod val="40000"/>
-                    <a:lumOff val="60000"/>
-                  </a:schemeClr>
-                </a:solidFill>
-                <a:latin typeface="Bahnschrift Light" panose="020B0502040204020203" pitchFamily="34" charset="0"/>
-              </a:rPr>
-              <a:t>)</a:t>
+              <a:t>Movie-genre(Genre_id) → Genre(Genre_id)</a:t>
             </a:r>
           </a:p>
           <a:p>
@@ -8888,55 +8405,7 @@
                 </a:solidFill>
                 <a:latin typeface="Bahnschrift Light" panose="020B0502040204020203" pitchFamily="34" charset="0"/>
               </a:rPr>
-              <a:t>Movie-keyword(</a:t>
-            </a:r>
-            <a:r>
-              <a:rPr lang="en-US" sz="1400" dirty="0" err="1">
-                <a:solidFill>
-                  <a:schemeClr val="accent4">
-                    <a:lumMod val="40000"/>
-                    <a:lumOff val="60000"/>
-                  </a:schemeClr>
-                </a:solidFill>
-                <a:latin typeface="Bahnschrift Light" panose="020B0502040204020203" pitchFamily="34" charset="0"/>
-              </a:rPr>
-              <a:t>Movie_id</a:t>
-            </a:r>
-            <a:r>
-              <a:rPr lang="en-US" sz="1400" dirty="0">
-                <a:solidFill>
-                  <a:schemeClr val="accent4">
-                    <a:lumMod val="40000"/>
-                    <a:lumOff val="60000"/>
-                  </a:schemeClr>
-                </a:solidFill>
-                <a:latin typeface="Bahnschrift Light" panose="020B0502040204020203" pitchFamily="34" charset="0"/>
-              </a:rPr>
-              <a:t>) → Movie(</a:t>
-            </a:r>
-            <a:r>
-              <a:rPr lang="en-US" sz="1400" dirty="0" err="1">
-                <a:solidFill>
-                  <a:schemeClr val="accent4">
-                    <a:lumMod val="40000"/>
-                    <a:lumOff val="60000"/>
-                  </a:schemeClr>
-                </a:solidFill>
-                <a:latin typeface="Bahnschrift Light" panose="020B0502040204020203" pitchFamily="34" charset="0"/>
-              </a:rPr>
-              <a:t>Movie_id</a:t>
-            </a:r>
-            <a:r>
-              <a:rPr lang="en-US" sz="1400" dirty="0">
-                <a:solidFill>
-                  <a:schemeClr val="accent4">
-                    <a:lumMod val="40000"/>
-                    <a:lumOff val="60000"/>
-                  </a:schemeClr>
-                </a:solidFill>
-                <a:latin typeface="Bahnschrift Light" panose="020B0502040204020203" pitchFamily="34" charset="0"/>
-              </a:rPr>
-              <a:t>)</a:t>
+              <a:t>Movie-keyword(Movie_id) → Movie(Movie_id)</a:t>
             </a:r>
           </a:p>
           <a:p>
@@ -8957,43 +8426,19 @@
                 </a:solidFill>
                 <a:latin typeface="Bahnschrift Light" panose="020B0502040204020203" pitchFamily="34" charset="0"/>
               </a:rPr>
-              <a:t>Movie-keyword(</a:t>
-            </a:r>
-            <a:r>
-              <a:rPr lang="en-US" sz="1400" dirty="0" err="1">
-                <a:solidFill>
-                  <a:schemeClr val="accent4">
-                    <a:lumMod val="40000"/>
-                    <a:lumOff val="60000"/>
-                  </a:schemeClr>
-                </a:solidFill>
-                <a:latin typeface="Bahnschrift Light" panose="020B0502040204020203" pitchFamily="34" charset="0"/>
-              </a:rPr>
-              <a:t>Keyword_id</a:t>
-            </a:r>
-            <a:r>
-              <a:rPr lang="en-US" sz="1400" dirty="0">
-                <a:solidFill>
-                  <a:schemeClr val="accent4">
-                    <a:lumMod val="40000"/>
-                    <a:lumOff val="60000"/>
-                  </a:schemeClr>
-                </a:solidFill>
-                <a:latin typeface="Bahnschrift Light" panose="020B0502040204020203" pitchFamily="34" charset="0"/>
-              </a:rPr>
-              <a:t>) → Keywords(</a:t>
-            </a:r>
-            <a:r>
-              <a:rPr lang="en-US" sz="1400" dirty="0" err="1">
-                <a:solidFill>
-                  <a:schemeClr val="accent4">
-                    <a:lumMod val="40000"/>
-                    <a:lumOff val="60000"/>
-                  </a:schemeClr>
-                </a:solidFill>
-                <a:latin typeface="Bahnschrift Light" panose="020B0502040204020203" pitchFamily="34" charset="0"/>
-              </a:rPr>
-              <a:t>Keyword_id</a:t>
+              <a:t>Movie-keyword(Keyword_id) → Keyword(Keyword_id</a:t>
+            </a:r>
+            <a:r>
+              <a:rPr lang="he-IL" sz="1400" dirty="0">
+                <a:solidFill>
+                  <a:schemeClr val="accent4">
+                    <a:lumMod val="40000"/>
+                    <a:lumOff val="60000"/>
+                  </a:schemeClr>
+                </a:solidFill>
+                <a:latin typeface="Bahnschrift Light" panose="020B0502040204020203" pitchFamily="34" charset="0"/>
+              </a:rPr>
+              <a:t>(</a:t>
             </a:r>
             <a:endParaRPr lang="en-US" sz="1400" dirty="0">
               <a:solidFill>
@@ -9497,7 +8942,7 @@
                 </a:solidFill>
                 <a:latin typeface="Bahnschrift Light" panose="020B0502040204020203" pitchFamily="34" charset="0"/>
               </a:rPr>
-              <a:t>Information is divided into separate tables for genres, keywords, and people. </a:t>
+              <a:t>Information is divided into separate tables for movies, genres, keywords, and people. </a:t>
             </a:r>
           </a:p>
           <a:p>
@@ -9581,31 +9026,7 @@
                 </a:solidFill>
                 <a:latin typeface="Bahnschrift Light" panose="020B0502040204020203" pitchFamily="34" charset="0"/>
               </a:rPr>
-              <a:t>One-to-Many Relationship: The relationship between a movie and its director is one-to-many, so the </a:t>
-            </a:r>
-            <a:r>
-              <a:rPr lang="en-US" sz="1400" dirty="0" err="1">
-                <a:solidFill>
-                  <a:schemeClr val="accent4">
-                    <a:lumMod val="40000"/>
-                    <a:lumOff val="60000"/>
-                  </a:schemeClr>
-                </a:solidFill>
-                <a:latin typeface="Bahnschrift Light" panose="020B0502040204020203" pitchFamily="34" charset="0"/>
-              </a:rPr>
-              <a:t>Director_id</a:t>
-            </a:r>
-            <a:r>
-              <a:rPr lang="en-US" sz="1400" dirty="0">
-                <a:solidFill>
-                  <a:schemeClr val="accent4">
-                    <a:lumMod val="40000"/>
-                    <a:lumOff val="60000"/>
-                  </a:schemeClr>
-                </a:solidFill>
-                <a:latin typeface="Bahnschrift Light" panose="020B0502040204020203" pitchFamily="34" charset="0"/>
-              </a:rPr>
-              <a:t> attribute is included as a column in the Movie table.</a:t>
+              <a:t>One-to-Many Relationship: The relationship between a movie and its director is one-to-many, so the Director_id attribute is included as a column in the Movie table.</a:t>
             </a:r>
           </a:p>
           <a:p>
@@ -9869,28 +9290,16 @@
               <a:buChar char="•"/>
             </a:pPr>
             <a:r>
-              <a:rPr lang="en-US" sz="1400" dirty="0" err="1">
-                <a:solidFill>
-                  <a:schemeClr val="accent4">
-                    <a:lumMod val="40000"/>
-                    <a:lumOff val="60000"/>
-                  </a:schemeClr>
-                </a:solidFill>
-                <a:latin typeface="Bahnschrift Light" panose="020B0502040204020203" pitchFamily="34" charset="0"/>
-              </a:rPr>
-              <a:t>Fulltext</a:t>
-            </a:r>
-            <a:r>
-              <a:rPr lang="en-US" sz="1400" dirty="0">
-                <a:solidFill>
-                  <a:schemeClr val="accent4">
-                    <a:lumMod val="40000"/>
-                    <a:lumOff val="60000"/>
-                  </a:schemeClr>
-                </a:solidFill>
-                <a:latin typeface="Bahnschrift Light" panose="020B0502040204020203" pitchFamily="34" charset="0"/>
-              </a:rPr>
-              <a:t> index on title and overview that supports complex textual search;</a:t>
+              <a:rPr lang="en-US" sz="1400" dirty="0">
+                <a:solidFill>
+                  <a:schemeClr val="accent4">
+                    <a:lumMod val="40000"/>
+                    <a:lumOff val="60000"/>
+                  </a:schemeClr>
+                </a:solidFill>
+                <a:latin typeface="Bahnschrift Light" panose="020B0502040204020203" pitchFamily="34" charset="0"/>
+              </a:rPr>
+              <a:t>Fulltext index on title and overview that supports complex textual search;</a:t>
             </a:r>
           </a:p>
           <a:p>
@@ -9911,31 +9320,7 @@
                 </a:solidFill>
                 <a:latin typeface="Bahnschrift Light" panose="020B0502040204020203" pitchFamily="34" charset="0"/>
               </a:rPr>
-              <a:t>Index on </a:t>
-            </a:r>
-            <a:r>
-              <a:rPr lang="en-US" sz="1400" dirty="0" err="1">
-                <a:solidFill>
-                  <a:schemeClr val="accent4">
-                    <a:lumMod val="40000"/>
-                    <a:lumOff val="60000"/>
-                  </a:schemeClr>
-                </a:solidFill>
-                <a:latin typeface="Bahnschrift Light" panose="020B0502040204020203" pitchFamily="34" charset="0"/>
-              </a:rPr>
-              <a:t>release_year</a:t>
-            </a:r>
-            <a:r>
-              <a:rPr lang="en-US" sz="1400" dirty="0">
-                <a:solidFill>
-                  <a:schemeClr val="accent4">
-                    <a:lumMod val="40000"/>
-                    <a:lumOff val="60000"/>
-                  </a:schemeClr>
-                </a:solidFill>
-                <a:latin typeface="Bahnschrift Light" panose="020B0502040204020203" pitchFamily="34" charset="0"/>
-              </a:rPr>
-              <a:t> that supports filtering movies by year;</a:t>
+              <a:t>Index on release_year that supports filtering movies by year;</a:t>
             </a:r>
           </a:p>
           <a:p>
@@ -9977,31 +9362,7 @@
                 </a:solidFill>
                 <a:latin typeface="Bahnschrift Light" panose="020B0502040204020203" pitchFamily="34" charset="0"/>
               </a:rPr>
-              <a:t>Index on </a:t>
-            </a:r>
-            <a:r>
-              <a:rPr lang="en-US" sz="1400" dirty="0" err="1">
-                <a:solidFill>
-                  <a:schemeClr val="accent4">
-                    <a:lumMod val="40000"/>
-                    <a:lumOff val="60000"/>
-                  </a:schemeClr>
-                </a:solidFill>
-                <a:latin typeface="Bahnschrift Light" panose="020B0502040204020203" pitchFamily="34" charset="0"/>
-              </a:rPr>
-              <a:t>vote_average</a:t>
-            </a:r>
-            <a:r>
-              <a:rPr lang="en-US" sz="1400" dirty="0">
-                <a:solidFill>
-                  <a:schemeClr val="accent4">
-                    <a:lumMod val="40000"/>
-                    <a:lumOff val="60000"/>
-                  </a:schemeClr>
-                </a:solidFill>
-                <a:latin typeface="Bahnschrift Light" panose="020B0502040204020203" pitchFamily="34" charset="0"/>
-              </a:rPr>
-              <a:t> that supports filtering movies by vote average;</a:t>
+              <a:t>Index on vote_average that supports filtering movies by vote average;</a:t>
             </a:r>
           </a:p>
           <a:p>
@@ -10022,55 +9383,7 @@
                 </a:solidFill>
                 <a:latin typeface="Bahnschrift Light" panose="020B0502040204020203" pitchFamily="34" charset="0"/>
               </a:rPr>
-              <a:t>Index on </a:t>
-            </a:r>
-            <a:r>
-              <a:rPr lang="en-US" sz="1400" dirty="0" err="1">
-                <a:solidFill>
-                  <a:schemeClr val="accent4">
-                    <a:lumMod val="40000"/>
-                    <a:lumOff val="60000"/>
-                  </a:schemeClr>
-                </a:solidFill>
-                <a:latin typeface="Bahnschrift Light" panose="020B0502040204020203" pitchFamily="34" charset="0"/>
-              </a:rPr>
-              <a:t>keyword_name</a:t>
-            </a:r>
-            <a:r>
-              <a:rPr lang="en-US" sz="1400" dirty="0">
-                <a:solidFill>
-                  <a:schemeClr val="accent4">
-                    <a:lumMod val="40000"/>
-                    <a:lumOff val="60000"/>
-                  </a:schemeClr>
-                </a:solidFill>
-                <a:latin typeface="Bahnschrift Light" panose="020B0502040204020203" pitchFamily="34" charset="0"/>
-              </a:rPr>
-              <a:t> – the unusual index that is defined on the </a:t>
-            </a:r>
-            <a:r>
-              <a:rPr lang="en-US" sz="1400" dirty="0" err="1">
-                <a:solidFill>
-                  <a:schemeClr val="accent4">
-                    <a:lumMod val="40000"/>
-                    <a:lumOff val="60000"/>
-                  </a:schemeClr>
-                </a:solidFill>
-                <a:latin typeface="Bahnschrift Light" panose="020B0502040204020203" pitchFamily="34" charset="0"/>
-              </a:rPr>
-              <a:t>keyord</a:t>
-            </a:r>
-            <a:r>
-              <a:rPr lang="en-US" sz="1400" dirty="0">
-                <a:solidFill>
-                  <a:schemeClr val="accent4">
-                    <a:lumMod val="40000"/>
-                    <a:lumOff val="60000"/>
-                  </a:schemeClr>
-                </a:solidFill>
-                <a:latin typeface="Bahnschrift Light" panose="020B0502040204020203" pitchFamily="34" charset="0"/>
-              </a:rPr>
-              <a:t> table. Supports inserting unique keywords.</a:t>
+              <a:t>Index on keyword_name – the unusual index that is defined on the keyord table. Supports inserting unique keywords (enforcing the ‘unique’ requirement while inserting).</a:t>
             </a:r>
           </a:p>
         </p:txBody>
@@ -10404,7 +9717,7 @@
                 </a:solidFill>
                 <a:latin typeface="Bahnschrift Light" panose="020B0502040204020203" pitchFamily="34" charset="0"/>
               </a:rPr>
-              <a:t>Allows users to search for movies based on words in the title or overview.</a:t>
+              <a:t>Allows users to search for movies based on a word in the title or overview.</a:t>
             </a:r>
           </a:p>
           <a:p>
@@ -10509,31 +9822,7 @@
                 </a:solidFill>
                 <a:latin typeface="Bahnschrift Light" panose="020B0502040204020203" pitchFamily="34" charset="0"/>
               </a:rPr>
-              <a:t>The full-text index we created on (</a:t>
-            </a:r>
-            <a:r>
-              <a:rPr lang="en-US" sz="1400" dirty="0" err="1">
-                <a:solidFill>
-                  <a:schemeClr val="accent4">
-                    <a:lumMod val="40000"/>
-                    <a:lumOff val="60000"/>
-                  </a:schemeClr>
-                </a:solidFill>
-                <a:latin typeface="Bahnschrift Light" panose="020B0502040204020203" pitchFamily="34" charset="0"/>
-              </a:rPr>
-              <a:t>title,overview</a:t>
-            </a:r>
-            <a:r>
-              <a:rPr lang="en-US" sz="1400" dirty="0">
-                <a:solidFill>
-                  <a:schemeClr val="accent4">
-                    <a:lumMod val="40000"/>
-                    <a:lumOff val="60000"/>
-                  </a:schemeClr>
-                </a:solidFill>
-                <a:latin typeface="Bahnschrift Light" panose="020B0502040204020203" pitchFamily="34" charset="0"/>
-              </a:rPr>
-              <a:t>) supports efficient execution of this query.</a:t>
+              <a:t>The full-text index we created on (title,overview) supports efficient execution of this query.</a:t>
             </a:r>
           </a:p>
         </p:txBody>
@@ -10882,31 +10171,7 @@
                 </a:solidFill>
                 <a:latin typeface="Bahnschrift Light" panose="020B0502040204020203" pitchFamily="34" charset="0"/>
               </a:rPr>
-              <a:t>The full-text index we created on </a:t>
-            </a:r>
-            <a:r>
-              <a:rPr lang="en-US" sz="1400" dirty="0" err="1">
-                <a:solidFill>
-                  <a:schemeClr val="accent4">
-                    <a:lumMod val="40000"/>
-                    <a:lumOff val="60000"/>
-                  </a:schemeClr>
-                </a:solidFill>
-                <a:latin typeface="Bahnschrift Light" panose="020B0502040204020203" pitchFamily="34" charset="0"/>
-              </a:rPr>
-              <a:t>keyword_name</a:t>
-            </a:r>
-            <a:r>
-              <a:rPr lang="en-US" sz="1400" dirty="0">
-                <a:solidFill>
-                  <a:schemeClr val="accent4">
-                    <a:lumMod val="40000"/>
-                    <a:lumOff val="60000"/>
-                  </a:schemeClr>
-                </a:solidFill>
-                <a:latin typeface="Bahnschrift Light" panose="020B0502040204020203" pitchFamily="34" charset="0"/>
-              </a:rPr>
-              <a:t> supports efficient execution of this query.</a:t>
+              <a:t>The full-text index we created on keyword_name supports efficient execution of this query.</a:t>
             </a:r>
           </a:p>
         </p:txBody>

</xml_diff>